<commit_message>
Added a PDF version of the slides
Fixed formatting issues on the slides
</commit_message>
<xml_diff>
--- a/materials/Drown_Attack.pptx
+++ b/materials/Drown_Attack.pptx
@@ -3356,17 +3356,7 @@
           <a:bodyPr/>
           <a:lstStyle/>
           <a:p>
-            <a:pPr defTabSz="560831">
-              <a:defRPr sz="7679"/>
-            </a:pPr>
-            <a:r>
-              <a:t>DROWN Attack Template</a:t>
-            </a:r>
-          </a:p>
-          <a:p>
-            <a:pPr defTabSz="560831">
-              <a:defRPr sz="5760"/>
-            </a:pPr>
+            <a:pPr/>
             <a:r>
               <a:t>Attack Flow </a:t>
             </a:r>
@@ -3508,21 +3498,10 @@
           <a:bodyPr/>
           <a:lstStyle/>
           <a:p>
-            <a:pPr defTabSz="519937">
-              <a:defRPr sz="7119"/>
-            </a:pPr>
+            <a:pPr/>
             <a:r>
               <a:t>General DROWN</a:t>
             </a:r>
-          </a:p>
-          <a:p>
-            <a:pPr defTabSz="519937">
-              <a:defRPr sz="5340"/>
-            </a:pPr>
-            <a:r>
-              <a:t>CVE-2016-0800 </a:t>
-            </a:r>
-            <a:endParaRPr sz="1068"/>
           </a:p>
         </p:txBody>
       </p:sp>
@@ -3543,94 +3522,105 @@
           <a:bodyPr/>
           <a:lstStyle/>
           <a:p>
-            <a:pPr marL="229743" indent="-229743" defTabSz="391414">
-              <a:spcBef>
-                <a:spcPts val="2100"/>
-              </a:spcBef>
-              <a:defRPr sz="1876"/>
+            <a:pPr marL="222884" indent="-222884" defTabSz="379729">
+              <a:spcBef>
+                <a:spcPts val="2000"/>
+              </a:spcBef>
+              <a:defRPr sz="1819"/>
+            </a:pPr>
+            <a:r>
+              <a:t>Given identifier CVE-2016-0800 </a:t>
+            </a:r>
+          </a:p>
+          <a:p>
+            <a:pPr marL="222884" indent="-222884" defTabSz="379729">
+              <a:spcBef>
+                <a:spcPts val="2000"/>
+              </a:spcBef>
+              <a:defRPr sz="1819"/>
             </a:pPr>
             <a:r>
               <a:t>Any correct SSLv2 implementation that accepts export grade cipher suites can be used as an oracle</a:t>
             </a:r>
           </a:p>
           <a:p>
-            <a:pPr marL="229743" indent="-229743" defTabSz="391414">
-              <a:spcBef>
-                <a:spcPts val="2100"/>
-              </a:spcBef>
-              <a:defRPr sz="1876"/>
+            <a:pPr marL="222884" indent="-222884" defTabSz="379729">
+              <a:spcBef>
+                <a:spcPts val="2000"/>
+              </a:spcBef>
+              <a:defRPr sz="1819"/>
             </a:pPr>
             <a:r>
               <a:t>SSLv2 is vulnerable to a direct message side channel vulnerability exposing a Bleichenbacher oracle to the attacker</a:t>
             </a:r>
           </a:p>
           <a:p>
-            <a:pPr marL="229743" indent="-229743" defTabSz="391414">
-              <a:spcBef>
-                <a:spcPts val="2100"/>
-              </a:spcBef>
-              <a:defRPr sz="1876"/>
+            <a:pPr marL="222884" indent="-222884" defTabSz="379729">
+              <a:spcBef>
+                <a:spcPts val="2000"/>
+              </a:spcBef>
+              <a:defRPr sz="1819"/>
             </a:pPr>
             <a:r>
               <a:t>The vulnerabilities follows 3 properties of SSLv2</a:t>
             </a:r>
           </a:p>
           <a:p>
-            <a:pPr lvl="1" marL="756355" indent="-330905" defTabSz="391414">
-              <a:spcBef>
-                <a:spcPts val="2100"/>
+            <a:pPr lvl="1" marL="733777" indent="-321027" defTabSz="379729">
+              <a:spcBef>
+                <a:spcPts val="2000"/>
               </a:spcBef>
               <a:buSzPct val="100000"/>
               <a:buAutoNum type="arabicPeriod" startAt="1"/>
-              <a:defRPr sz="1876"/>
+              <a:defRPr sz="1819"/>
             </a:pPr>
             <a:r>
               <a:t>The server immediately responds with a ServerVerify message after receiving the ClientMasterKey message</a:t>
             </a:r>
           </a:p>
           <a:p>
-            <a:pPr lvl="3" marL="1125079" indent="-231633" defTabSz="391414">
-              <a:spcBef>
-                <a:spcPts val="2100"/>
-              </a:spcBef>
-              <a:defRPr sz="1876"/>
+            <a:pPr lvl="3" marL="1091494" indent="-224719" defTabSz="379729">
+              <a:spcBef>
+                <a:spcPts val="2000"/>
+              </a:spcBef>
+              <a:defRPr sz="1819"/>
             </a:pPr>
             <a:r>
               <a:t>Includes the RSA ciphertext, without waiting for the ClientFinished message</a:t>
             </a:r>
           </a:p>
           <a:p>
-            <a:pPr lvl="3" marL="1125079" indent="-231633" defTabSz="391414">
-              <a:spcBef>
-                <a:spcPts val="2100"/>
-              </a:spcBef>
-              <a:defRPr sz="1876"/>
+            <a:pPr lvl="3" marL="1091494" indent="-224719" defTabSz="379729">
+              <a:spcBef>
+                <a:spcPts val="2000"/>
+              </a:spcBef>
+              <a:defRPr sz="1819"/>
             </a:pPr>
             <a:r>
               <a:t>Proves that the client knows the RSA plaintext</a:t>
             </a:r>
           </a:p>
           <a:p>
-            <a:pPr lvl="1" marL="756355" indent="-330905" defTabSz="391414">
-              <a:spcBef>
-                <a:spcPts val="2100"/>
+            <a:pPr lvl="1" marL="733777" indent="-321027" defTabSz="379729">
+              <a:spcBef>
+                <a:spcPts val="2000"/>
               </a:spcBef>
               <a:buSzPct val="100000"/>
               <a:buAutoNum type="arabicPeriod" startAt="1"/>
-              <a:defRPr sz="1876"/>
+              <a:defRPr sz="1819"/>
             </a:pPr>
             <a:r>
               <a:t>When choosing 40-bit export RC2 or RC4 as the symmetric cipher, only 5 bytes of the master_key are sent encrypted using RSA, and the remaining 11 bytes are sent in cleartext</a:t>
             </a:r>
           </a:p>
           <a:p>
-            <a:pPr lvl="1" marL="756355" indent="-330905" defTabSz="391414">
-              <a:spcBef>
-                <a:spcPts val="2100"/>
+            <a:pPr lvl="1" marL="733777" indent="-321027" defTabSz="379729">
+              <a:spcBef>
+                <a:spcPts val="2000"/>
               </a:spcBef>
               <a:buSzPct val="100000"/>
               <a:buAutoNum type="arabicPeriod" startAt="1"/>
-              <a:defRPr sz="1876"/>
+              <a:defRPr sz="1819"/>
             </a:pPr>
             <a:r>
               <a:t>Server implementation that correctly implements the anti-Bleichenbacher counter- measure and receives an RSA key exchange message with invalid padding will generate a random premaster secret and carry out the rest of the TLS handshake using this randomly generated key material </a:t>
@@ -3679,19 +3669,13 @@
         </p:spPr>
         <p:txBody>
           <a:bodyPr/>
-          <a:lstStyle/>
-          <a:p>
-            <a:pPr defTabSz="560831">
-              <a:defRPr sz="7679"/>
-            </a:pPr>
-            <a:r>
-              <a:t>General DROWN</a:t>
-            </a:r>
-          </a:p>
-          <a:p>
-            <a:pPr defTabSz="560831">
-              <a:defRPr sz="5760"/>
-            </a:pPr>
+          <a:lstStyle>
+            <a:lvl1pPr defTabSz="531622">
+              <a:defRPr sz="7280"/>
+            </a:lvl1pPr>
+          </a:lstStyle>
+          <a:p>
+            <a:pPr/>
             <a:r>
               <a:t>Validating RSA ciphertexts</a:t>
             </a:r>
@@ -3895,24 +3879,16 @@
           <a:bodyPr/>
           <a:lstStyle/>
           <a:p>
-            <a:pPr defTabSz="455675">
-              <a:defRPr sz="6240"/>
-            </a:pPr>
-            <a:r>
-              <a:t>General DROWN</a:t>
-            </a:r>
-          </a:p>
-          <a:p>
-            <a:pPr defTabSz="455675">
-              <a:defRPr sz="4680"/>
+            <a:pPr>
+              <a:defRPr sz="6000"/>
             </a:pPr>
             <a:r>
               <a:t>TLS Decryption Attack</a:t>
             </a:r>
           </a:p>
           <a:p>
-            <a:pPr defTabSz="455675">
-              <a:defRPr sz="2496"/>
+            <a:pPr>
+              <a:defRPr sz="3200"/>
             </a:pPr>
             <a:r>
               <a:t>Attack Scenario</a:t>
@@ -4025,24 +4001,16 @@
           <a:bodyPr/>
           <a:lstStyle/>
           <a:p>
-            <a:pPr defTabSz="455675">
-              <a:defRPr sz="6240"/>
-            </a:pPr>
-            <a:r>
-              <a:t>General DROWN</a:t>
-            </a:r>
-          </a:p>
-          <a:p>
-            <a:pPr defTabSz="455675">
-              <a:defRPr sz="4680"/>
+            <a:pPr>
+              <a:defRPr sz="6000"/>
             </a:pPr>
             <a:r>
               <a:t>TLS Decryption Attack</a:t>
             </a:r>
           </a:p>
           <a:p>
-            <a:pPr defTabSz="455675">
-              <a:defRPr sz="2496"/>
+            <a:pPr>
+              <a:defRPr sz="3200"/>
             </a:pPr>
             <a:r>
               <a:t>Constructing the Attack</a:t>
@@ -4233,24 +4201,16 @@
           <a:bodyPr/>
           <a:lstStyle/>
           <a:p>
-            <a:pPr defTabSz="455675">
-              <a:defRPr sz="6240"/>
-            </a:pPr>
-            <a:r>
-              <a:t>General DROWN</a:t>
-            </a:r>
-          </a:p>
-          <a:p>
-            <a:pPr defTabSz="455675">
-              <a:defRPr sz="4680"/>
+            <a:pPr>
+              <a:defRPr sz="6000"/>
             </a:pPr>
             <a:r>
               <a:t>TLS Decryption Attack</a:t>
             </a:r>
           </a:p>
           <a:p>
-            <a:pPr defTabSz="455675">
-              <a:defRPr sz="2496"/>
+            <a:pPr>
+              <a:defRPr sz="3200"/>
             </a:pPr>
             <a:r>
               <a:t>Cost of the Attack</a:t>
@@ -4350,23 +4310,16 @@
         </p:spPr>
         <p:txBody>
           <a:bodyPr/>
-          <a:lstStyle/>
-          <a:p>
-            <a:pPr defTabSz="519937">
-              <a:defRPr sz="7119"/>
-            </a:pPr>
+          <a:lstStyle>
+            <a:lvl1pPr defTabSz="560831">
+              <a:defRPr sz="7679"/>
+            </a:lvl1pPr>
+          </a:lstStyle>
+          <a:p>
+            <a:pPr/>
             <a:r>
               <a:t>Special DROWN Attack</a:t>
             </a:r>
-          </a:p>
-          <a:p>
-            <a:pPr defTabSz="519937">
-              <a:defRPr sz="5340"/>
-            </a:pPr>
-            <a:r>
-              <a:t>CVE-2016-0703</a:t>
-            </a:r>
-            <a:endParaRPr sz="1068"/>
           </a:p>
         </p:txBody>
       </p:sp>
@@ -4387,19 +4340,45 @@
           <a:bodyPr/>
           <a:lstStyle/>
           <a:p>
-            <a:pPr/>
+            <a:pPr marL="413384" indent="-413384" defTabSz="543305">
+              <a:spcBef>
+                <a:spcPts val="3900"/>
+              </a:spcBef>
+              <a:defRPr sz="3348"/>
+            </a:pPr>
+            <a:r>
+              <a:t>Given identifier CVE-2016-0703</a:t>
+            </a:r>
+          </a:p>
+          <a:p>
+            <a:pPr marL="413384" indent="-413384" defTabSz="543305">
+              <a:spcBef>
+                <a:spcPts val="3900"/>
+              </a:spcBef>
+              <a:defRPr sz="3348"/>
+            </a:pPr>
             <a:r>
               <a:t>There was vulnerability in OpenSSLv2 handshake code that allowed for that creates a powerful Bleichenbacher oracle, and drastically reduces the amount of computation required to implement the attack</a:t>
             </a:r>
           </a:p>
           <a:p>
-            <a:pPr/>
+            <a:pPr marL="413384" indent="-413384" defTabSz="543305">
+              <a:spcBef>
+                <a:spcPts val="3900"/>
+              </a:spcBef>
+              <a:defRPr sz="3348"/>
+            </a:pPr>
             <a:r>
               <a:t>Can cut the number of connections required by 50% </a:t>
             </a:r>
           </a:p>
           <a:p>
-            <a:pPr/>
+            <a:pPr marL="413384" indent="-413384" defTabSz="543305">
+              <a:spcBef>
+                <a:spcPts val="3900"/>
+              </a:spcBef>
+              <a:defRPr sz="3348"/>
+            </a:pPr>
             <a:r>
               <a:t>Reduces the computational work to a negotiable amount</a:t>
             </a:r>
@@ -4449,21 +4428,11 @@
           <a:bodyPr/>
           <a:lstStyle/>
           <a:p>
-            <a:pPr defTabSz="519937">
-              <a:defRPr sz="7119"/>
-            </a:pPr>
-            <a:r>
-              <a:t>Special DROWN Attack</a:t>
-            </a:r>
-          </a:p>
-          <a:p>
-            <a:pPr defTabSz="519937">
-              <a:defRPr sz="5340"/>
-            </a:pPr>
+            <a:pPr/>
             <a:r>
               <a:t>“Extras Clear” Oracle </a:t>
             </a:r>
-            <a:endParaRPr sz="1068"/>
+            <a:endParaRPr sz="1200"/>
           </a:p>
         </p:txBody>
       </p:sp>
@@ -4866,23 +4835,17 @@
         </p:spPr>
         <p:txBody>
           <a:bodyPr/>
-          <a:lstStyle/>
-          <a:p>
-            <a:pPr defTabSz="519937">
-              <a:defRPr sz="7119"/>
-            </a:pPr>
-            <a:r>
-              <a:t>Special DROWN Attack</a:t>
-            </a:r>
-          </a:p>
-          <a:p>
-            <a:pPr defTabSz="519937">
-              <a:defRPr sz="5340"/>
-            </a:pPr>
+          <a:lstStyle>
+            <a:lvl1pPr defTabSz="490727">
+              <a:defRPr sz="6719"/>
+            </a:lvl1pPr>
+          </a:lstStyle>
+          <a:p>
+            <a:pPr/>
             <a:r>
               <a:t>“Extras Clear” Oracle Contd. </a:t>
             </a:r>
-            <a:endParaRPr sz="1068"/>
+            <a:endParaRPr sz="1008"/>
           </a:p>
         </p:txBody>
       </p:sp>
@@ -5050,19 +5013,13 @@
         </p:spPr>
         <p:txBody>
           <a:bodyPr/>
-          <a:lstStyle/>
-          <a:p>
-            <a:pPr defTabSz="560831">
-              <a:defRPr sz="7679"/>
-            </a:pPr>
-            <a:r>
-              <a:t>Special DROWN Attack</a:t>
-            </a:r>
-          </a:p>
-          <a:p>
-            <a:pPr defTabSz="560831">
-              <a:defRPr sz="5760"/>
-            </a:pPr>
+          <a:lstStyle>
+            <a:lvl1pPr>
+              <a:defRPr sz="6000"/>
+            </a:lvl1pPr>
+          </a:lstStyle>
+          <a:p>
+            <a:pPr/>
             <a:r>
               <a:t>Attack Scenario</a:t>
             </a:r>
@@ -5142,17 +5099,7 @@
           <a:bodyPr/>
           <a:lstStyle/>
           <a:p>
-            <a:pPr defTabSz="560831">
-              <a:defRPr sz="7679"/>
-            </a:pPr>
-            <a:r>
-              <a:t>Special DROWN Attack</a:t>
-            </a:r>
-          </a:p>
-          <a:p>
-            <a:pPr defTabSz="560831">
-              <a:defRPr sz="5760"/>
-            </a:pPr>
+            <a:pPr/>
             <a:r>
               <a:t>Constructing the Attack</a:t>
             </a:r>
@@ -5273,17 +5220,7 @@
           <a:bodyPr/>
           <a:lstStyle/>
           <a:p>
-            <a:pPr defTabSz="560831">
-              <a:defRPr sz="7679"/>
-            </a:pPr>
-            <a:r>
-              <a:t>Special DROWN Attack</a:t>
-            </a:r>
-          </a:p>
-          <a:p>
-            <a:pPr defTabSz="560831">
-              <a:defRPr sz="5760"/>
-            </a:pPr>
+            <a:pPr/>
             <a:r>
               <a:t>Attack Cost</a:t>
             </a:r>
@@ -5481,17 +5418,7 @@
           <a:bodyPr/>
           <a:lstStyle/>
           <a:p>
-            <a:pPr defTabSz="560831">
-              <a:defRPr sz="7679"/>
-            </a:pPr>
-            <a:r>
-              <a:t>Man In the Middle</a:t>
-            </a:r>
-          </a:p>
-          <a:p>
-            <a:pPr defTabSz="560831">
-              <a:defRPr sz="5760"/>
-            </a:pPr>
+            <a:pPr/>
             <a:r>
               <a:t>Attack Scenario</a:t>
             </a:r>
@@ -6627,17 +6554,7 @@
           <a:bodyPr/>
           <a:lstStyle/>
           <a:p>
-            <a:pPr>
-              <a:defRPr sz="6000"/>
-            </a:pPr>
-            <a:r>
-              <a:t>Breaking TLS with SSLv2 Contd. </a:t>
-            </a:r>
-          </a:p>
-          <a:p>
-            <a:pPr>
-              <a:defRPr sz="6000"/>
-            </a:pPr>
+            <a:pPr/>
             <a:r>
               <a:t>Attacker’s Position </a:t>
             </a:r>
@@ -6760,17 +6677,7 @@
           <a:bodyPr/>
           <a:lstStyle/>
           <a:p>
-            <a:pPr>
-              <a:defRPr sz="6000"/>
-            </a:pPr>
-            <a:r>
-              <a:t>Breaking TLS with SSLv2 Contd. </a:t>
-            </a:r>
-          </a:p>
-          <a:p>
-            <a:pPr>
-              <a:defRPr sz="6000"/>
-            </a:pPr>
+            <a:pPr/>
             <a:r>
               <a:t>Attacker’s Position </a:t>
             </a:r>

</xml_diff>